<commit_message>
final con ppt retocado
</commit_message>
<xml_diff>
--- a/Presentación modelo de regresión - Mid Bootcamp Project.pptx
+++ b/Presentación modelo de regresión - Mid Bootcamp Project.pptx
@@ -13,7 +13,7 @@
   <p:sldIdLst>
     <p:sldId id="2147470720" r:id="rId2"/>
     <p:sldId id="2147470716" r:id="rId3"/>
-    <p:sldId id="261" r:id="rId4"/>
+    <p:sldId id="2147470734" r:id="rId4"/>
     <p:sldId id="2147470717" r:id="rId5"/>
     <p:sldId id="258" r:id="rId6"/>
     <p:sldId id="2147470731" r:id="rId7"/>
@@ -138,7 +138,7 @@
 <p1510:revInfo xmlns:a="http://schemas.openxmlformats.org/drawingml/2006/main" xmlns:r="http://schemas.openxmlformats.org/officeDocument/2006/relationships" xmlns:p1510="http://schemas.microsoft.com/office/powerpoint/2015/10/main">
   <p1510:revLst>
     <p1510:client id="{1B272905-1BD7-47BB-A1B8-DEA5BE3D0F39}" v="8113" dt="2022-11-23T18:36:05.923"/>
-    <p1510:client id="{3D15CFF1-666B-4737-9425-6893B30B20E0}" v="136" dt="2022-11-24T08:13:14.960"/>
+    <p1510:client id="{3D15CFF1-666B-4737-9425-6893B30B20E0}" v="804" dt="2022-11-24T09:37:06.107"/>
     <p1510:client id="{8AF59F99-2874-4825-B924-A615B9752341}" v="2761" dt="2022-11-23T18:32:11.875"/>
     <p1510:client id="{8CAB3BD8-3D5E-4679-B81B-AC01F6AF0E37}" v="2491" dt="2022-11-23T18:04:38.992"/>
     <p1510:client id="{DA941AC2-94A5-4E1A-87DE-F72A1C059B02}" v="40" dt="2022-11-23T16:52:19.455"/>
@@ -150,11 +150,122 @@
 <pc:chgInfo xmlns:a="http://schemas.openxmlformats.org/drawingml/2006/main" xmlns:r="http://schemas.openxmlformats.org/officeDocument/2006/relationships" xmlns:ac="http://schemas.microsoft.com/office/drawing/2013/main/command" xmlns:pc="http://schemas.microsoft.com/office/powerpoint/2013/main/command">
   <pc:docChgLst>
     <pc:chgData name="Andrea Evrard Comas" userId="133e4c92-0019-454e-a908-a8ccb959cd34" providerId="ADAL" clId="{3D15CFF1-666B-4737-9425-6893B30B20E0}"/>
-    <pc:docChg chg="custSel modSld">
-      <pc:chgData name="Andrea Evrard Comas" userId="133e4c92-0019-454e-a908-a8ccb959cd34" providerId="ADAL" clId="{3D15CFF1-666B-4737-9425-6893B30B20E0}" dt="2022-11-24T08:13:04.198" v="7" actId="1076"/>
+    <pc:docChg chg="undo custSel addSld delSld modSld">
+      <pc:chgData name="Andrea Evrard Comas" userId="133e4c92-0019-454e-a908-a8ccb959cd34" providerId="ADAL" clId="{3D15CFF1-666B-4737-9425-6893B30B20E0}" dt="2022-11-24T09:36:59.758" v="119" actId="47"/>
       <pc:docMkLst>
         <pc:docMk/>
       </pc:docMkLst>
+      <pc:sldChg chg="addSp delSp modSp del mod">
+        <pc:chgData name="Andrea Evrard Comas" userId="133e4c92-0019-454e-a908-a8ccb959cd34" providerId="ADAL" clId="{3D15CFF1-666B-4737-9425-6893B30B20E0}" dt="2022-11-24T09:36:59.758" v="119" actId="47"/>
+        <pc:sldMkLst>
+          <pc:docMk/>
+          <pc:sldMk cId="3887058040" sldId="261"/>
+        </pc:sldMkLst>
+        <pc:spChg chg="add del">
+          <ac:chgData name="Andrea Evrard Comas" userId="133e4c92-0019-454e-a908-a8ccb959cd34" providerId="ADAL" clId="{3D15CFF1-666B-4737-9425-6893B30B20E0}" dt="2022-11-24T09:32:36.800" v="14" actId="478"/>
+          <ac:spMkLst>
+            <pc:docMk/>
+            <pc:sldMk cId="3887058040" sldId="261"/>
+            <ac:spMk id="2" creationId="{F4AD2E94-4B9B-405A-A936-FFA4D1ED2862}"/>
+          </ac:spMkLst>
+        </pc:spChg>
+        <pc:spChg chg="add del mod">
+          <ac:chgData name="Andrea Evrard Comas" userId="133e4c92-0019-454e-a908-a8ccb959cd34" providerId="ADAL" clId="{3D15CFF1-666B-4737-9425-6893B30B20E0}" dt="2022-11-24T09:32:36.800" v="14" actId="478"/>
+          <ac:spMkLst>
+            <pc:docMk/>
+            <pc:sldMk cId="3887058040" sldId="261"/>
+            <ac:spMk id="8" creationId="{0F371434-2026-4B50-9006-A7BB3E37589C}"/>
+          </ac:spMkLst>
+        </pc:spChg>
+        <pc:spChg chg="mod">
+          <ac:chgData name="Andrea Evrard Comas" userId="133e4c92-0019-454e-a908-a8ccb959cd34" providerId="ADAL" clId="{3D15CFF1-666B-4737-9425-6893B30B20E0}" dt="2022-11-24T09:32:23.461" v="8"/>
+          <ac:spMkLst>
+            <pc:docMk/>
+            <pc:sldMk cId="3887058040" sldId="261"/>
+            <ac:spMk id="17" creationId="{3915212E-BCC3-41DA-B16A-EF304E6B0EA0}"/>
+          </ac:spMkLst>
+        </pc:spChg>
+        <pc:spChg chg="mod">
+          <ac:chgData name="Andrea Evrard Comas" userId="133e4c92-0019-454e-a908-a8ccb959cd34" providerId="ADAL" clId="{3D15CFF1-666B-4737-9425-6893B30B20E0}" dt="2022-11-24T09:32:23.461" v="8"/>
+          <ac:spMkLst>
+            <pc:docMk/>
+            <pc:sldMk cId="3887058040" sldId="261"/>
+            <ac:spMk id="18" creationId="{93FC42DE-4203-4227-B45B-C0D72BBFD2D7}"/>
+          </ac:spMkLst>
+        </pc:spChg>
+        <pc:spChg chg="mod">
+          <ac:chgData name="Andrea Evrard Comas" userId="133e4c92-0019-454e-a908-a8ccb959cd34" providerId="ADAL" clId="{3D15CFF1-666B-4737-9425-6893B30B20E0}" dt="2022-11-24T09:32:23.461" v="8"/>
+          <ac:spMkLst>
+            <pc:docMk/>
+            <pc:sldMk cId="3887058040" sldId="261"/>
+            <ac:spMk id="19" creationId="{D339A350-7F94-4D73-A450-A604A4AEC323}"/>
+          </ac:spMkLst>
+        </pc:spChg>
+        <pc:spChg chg="mod">
+          <ac:chgData name="Andrea Evrard Comas" userId="133e4c92-0019-454e-a908-a8ccb959cd34" providerId="ADAL" clId="{3D15CFF1-666B-4737-9425-6893B30B20E0}" dt="2022-11-24T09:32:23.461" v="8"/>
+          <ac:spMkLst>
+            <pc:docMk/>
+            <pc:sldMk cId="3887058040" sldId="261"/>
+            <ac:spMk id="20" creationId="{0D680184-0848-47F1-BF8E-F0C7F384865E}"/>
+          </ac:spMkLst>
+        </pc:spChg>
+        <pc:spChg chg="mod">
+          <ac:chgData name="Andrea Evrard Comas" userId="133e4c92-0019-454e-a908-a8ccb959cd34" providerId="ADAL" clId="{3D15CFF1-666B-4737-9425-6893B30B20E0}" dt="2022-11-24T09:32:23.461" v="8"/>
+          <ac:spMkLst>
+            <pc:docMk/>
+            <pc:sldMk cId="3887058040" sldId="261"/>
+            <ac:spMk id="21" creationId="{681B60F6-0902-4079-BCFA-38C7BE554D31}"/>
+          </ac:spMkLst>
+        </pc:spChg>
+        <pc:spChg chg="mod">
+          <ac:chgData name="Andrea Evrard Comas" userId="133e4c92-0019-454e-a908-a8ccb959cd34" providerId="ADAL" clId="{3D15CFF1-666B-4737-9425-6893B30B20E0}" dt="2022-11-24T09:32:23.461" v="8"/>
+          <ac:spMkLst>
+            <pc:docMk/>
+            <pc:sldMk cId="3887058040" sldId="261"/>
+            <ac:spMk id="22" creationId="{8BD9E2BF-0865-4DC2-830E-F24AC05D7B3A}"/>
+          </ac:spMkLst>
+        </pc:spChg>
+        <pc:spChg chg="mod">
+          <ac:chgData name="Andrea Evrard Comas" userId="133e4c92-0019-454e-a908-a8ccb959cd34" providerId="ADAL" clId="{3D15CFF1-666B-4737-9425-6893B30B20E0}" dt="2022-11-24T09:32:23.461" v="8"/>
+          <ac:spMkLst>
+            <pc:docMk/>
+            <pc:sldMk cId="3887058040" sldId="261"/>
+            <ac:spMk id="23" creationId="{C646D548-F87B-4103-8DEA-D7EEFF11695D}"/>
+          </ac:spMkLst>
+        </pc:spChg>
+        <pc:spChg chg="mod">
+          <ac:chgData name="Andrea Evrard Comas" userId="133e4c92-0019-454e-a908-a8ccb959cd34" providerId="ADAL" clId="{3D15CFF1-666B-4737-9425-6893B30B20E0}" dt="2022-11-24T09:32:23.461" v="8"/>
+          <ac:spMkLst>
+            <pc:docMk/>
+            <pc:sldMk cId="3887058040" sldId="261"/>
+            <ac:spMk id="24" creationId="{C4718D75-BC9E-4501-9449-74ECCFE64FC1}"/>
+          </ac:spMkLst>
+        </pc:spChg>
+        <pc:spChg chg="mod">
+          <ac:chgData name="Andrea Evrard Comas" userId="133e4c92-0019-454e-a908-a8ccb959cd34" providerId="ADAL" clId="{3D15CFF1-666B-4737-9425-6893B30B20E0}" dt="2022-11-24T09:32:23.461" v="8"/>
+          <ac:spMkLst>
+            <pc:docMk/>
+            <pc:sldMk cId="3887058040" sldId="261"/>
+            <ac:spMk id="25" creationId="{34C9E9D7-A739-4FF0-BAEE-3A7E44992BB9}"/>
+          </ac:spMkLst>
+        </pc:spChg>
+        <pc:grpChg chg="add del mod">
+          <ac:chgData name="Andrea Evrard Comas" userId="133e4c92-0019-454e-a908-a8ccb959cd34" providerId="ADAL" clId="{3D15CFF1-666B-4737-9425-6893B30B20E0}" dt="2022-11-24T09:35:08.718" v="70" actId="478"/>
+          <ac:grpSpMkLst>
+            <pc:docMk/>
+            <pc:sldMk cId="3887058040" sldId="261"/>
+            <ac:grpSpMk id="16" creationId="{95D761E8-82C1-4D75-AE5F-EA27F3684FA2}"/>
+          </ac:grpSpMkLst>
+        </pc:grpChg>
+        <pc:graphicFrameChg chg="mod">
+          <ac:chgData name="Andrea Evrard Comas" userId="133e4c92-0019-454e-a908-a8ccb959cd34" providerId="ADAL" clId="{3D15CFF1-666B-4737-9425-6893B30B20E0}" dt="2022-11-24T09:32:36.812" v="16"/>
+          <ac:graphicFrameMkLst>
+            <pc:docMk/>
+            <pc:sldMk cId="3887058040" sldId="261"/>
+            <ac:graphicFrameMk id="4" creationId="{8151242A-E4F1-4B89-A511-5D7392C89FB6}"/>
+          </ac:graphicFrameMkLst>
+        </pc:graphicFrameChg>
+      </pc:sldChg>
       <pc:sldChg chg="modSp mod">
         <pc:chgData name="Andrea Evrard Comas" userId="133e4c92-0019-454e-a908-a8ccb959cd34" providerId="ADAL" clId="{3D15CFF1-666B-4737-9425-6893B30B20E0}" dt="2022-11-23T18:59:45.603" v="1" actId="20577"/>
         <pc:sldMkLst>
@@ -190,6 +301,189 @@
             <pc:docMk/>
             <pc:sldMk cId="2927836606" sldId="2147470723"/>
             <ac:picMk id="50" creationId="{B8631380-53BA-4B0F-9F3B-84F97AE29A06}"/>
+          </ac:picMkLst>
+        </pc:picChg>
+      </pc:sldChg>
+      <pc:sldChg chg="addSp delSp modSp add mod">
+        <pc:chgData name="Andrea Evrard Comas" userId="133e4c92-0019-454e-a908-a8ccb959cd34" providerId="ADAL" clId="{3D15CFF1-666B-4737-9425-6893B30B20E0}" dt="2022-11-24T09:36:53.661" v="118" actId="1036"/>
+        <pc:sldMkLst>
+          <pc:docMk/>
+          <pc:sldMk cId="2204397293" sldId="2147470734"/>
+        </pc:sldMkLst>
+        <pc:spChg chg="del mod">
+          <ac:chgData name="Andrea Evrard Comas" userId="133e4c92-0019-454e-a908-a8ccb959cd34" providerId="ADAL" clId="{3D15CFF1-666B-4737-9425-6893B30B20E0}" dt="2022-11-24T09:32:41.588" v="19" actId="478"/>
+          <ac:spMkLst>
+            <pc:docMk/>
+            <pc:sldMk cId="2204397293" sldId="2147470734"/>
+            <ac:spMk id="2" creationId="{F4AD2E94-4B9B-405A-A936-FFA4D1ED2862}"/>
+          </ac:spMkLst>
+        </pc:spChg>
+        <pc:spChg chg="mod">
+          <ac:chgData name="Andrea Evrard Comas" userId="133e4c92-0019-454e-a908-a8ccb959cd34" providerId="ADAL" clId="{3D15CFF1-666B-4737-9425-6893B30B20E0}" dt="2022-11-24T09:32:38.873" v="18"/>
+          <ac:spMkLst>
+            <pc:docMk/>
+            <pc:sldMk cId="2204397293" sldId="2147470734"/>
+            <ac:spMk id="5" creationId="{B861A9CD-9D06-4DAD-9E84-85286A58A954}"/>
+          </ac:spMkLst>
+        </pc:spChg>
+        <pc:spChg chg="add del mod">
+          <ac:chgData name="Andrea Evrard Comas" userId="133e4c92-0019-454e-a908-a8ccb959cd34" providerId="ADAL" clId="{3D15CFF1-666B-4737-9425-6893B30B20E0}" dt="2022-11-24T09:36:00.275" v="84" actId="478"/>
+          <ac:spMkLst>
+            <pc:docMk/>
+            <pc:sldMk cId="2204397293" sldId="2147470734"/>
+            <ac:spMk id="8" creationId="{A6D3FC39-4689-4015-8E89-DE9006AFA69A}"/>
+          </ac:spMkLst>
+        </pc:spChg>
+        <pc:spChg chg="mod">
+          <ac:chgData name="Andrea Evrard Comas" userId="133e4c92-0019-454e-a908-a8ccb959cd34" providerId="ADAL" clId="{3D15CFF1-666B-4737-9425-6893B30B20E0}" dt="2022-11-24T09:32:38.873" v="18"/>
+          <ac:spMkLst>
+            <pc:docMk/>
+            <pc:sldMk cId="2204397293" sldId="2147470734"/>
+            <ac:spMk id="9" creationId="{4067C779-14D6-4AD7-8EF4-26160CB43A1B}"/>
+          </ac:spMkLst>
+        </pc:spChg>
+        <pc:spChg chg="mod">
+          <ac:chgData name="Andrea Evrard Comas" userId="133e4c92-0019-454e-a908-a8ccb959cd34" providerId="ADAL" clId="{3D15CFF1-666B-4737-9425-6893B30B20E0}" dt="2022-11-24T09:35:41.112" v="82" actId="1076"/>
+          <ac:spMkLst>
+            <pc:docMk/>
+            <pc:sldMk cId="2204397293" sldId="2147470734"/>
+            <ac:spMk id="12" creationId="{85B1D1FB-57EF-4273-9AA2-BD14350F3496}"/>
+          </ac:spMkLst>
+        </pc:spChg>
+        <pc:spChg chg="del mod">
+          <ac:chgData name="Andrea Evrard Comas" userId="133e4c92-0019-454e-a908-a8ccb959cd34" providerId="ADAL" clId="{3D15CFF1-666B-4737-9425-6893B30B20E0}" dt="2022-11-24T09:32:43.227" v="22" actId="478"/>
+          <ac:spMkLst>
+            <pc:docMk/>
+            <pc:sldMk cId="2204397293" sldId="2147470734"/>
+            <ac:spMk id="13" creationId="{0D615A52-C2E4-4112-A794-3C231E76D35A}"/>
+          </ac:spMkLst>
+        </pc:spChg>
+        <pc:spChg chg="mod">
+          <ac:chgData name="Andrea Evrard Comas" userId="133e4c92-0019-454e-a908-a8ccb959cd34" providerId="ADAL" clId="{3D15CFF1-666B-4737-9425-6893B30B20E0}" dt="2022-11-24T09:34:52.841" v="65" actId="1036"/>
+          <ac:spMkLst>
+            <pc:docMk/>
+            <pc:sldMk cId="2204397293" sldId="2147470734"/>
+            <ac:spMk id="14" creationId="{9809D796-014A-438F-8F7B-4459F85F99C7}"/>
+          </ac:spMkLst>
+        </pc:spChg>
+        <pc:spChg chg="mod">
+          <ac:chgData name="Andrea Evrard Comas" userId="133e4c92-0019-454e-a908-a8ccb959cd34" providerId="ADAL" clId="{3D15CFF1-666B-4737-9425-6893B30B20E0}" dt="2022-11-24T09:32:38.873" v="18"/>
+          <ac:spMkLst>
+            <pc:docMk/>
+            <pc:sldMk cId="2204397293" sldId="2147470734"/>
+            <ac:spMk id="15" creationId="{E7EEBFED-2ECA-4B88-82F3-315F7586D898}"/>
+          </ac:spMkLst>
+        </pc:spChg>
+        <pc:spChg chg="mod">
+          <ac:chgData name="Andrea Evrard Comas" userId="133e4c92-0019-454e-a908-a8ccb959cd34" providerId="ADAL" clId="{3D15CFF1-666B-4737-9425-6893B30B20E0}" dt="2022-11-24T09:32:38.873" v="18"/>
+          <ac:spMkLst>
+            <pc:docMk/>
+            <pc:sldMk cId="2204397293" sldId="2147470734"/>
+            <ac:spMk id="17" creationId="{3915212E-BCC3-41DA-B16A-EF304E6B0EA0}"/>
+          </ac:spMkLst>
+        </pc:spChg>
+        <pc:spChg chg="mod">
+          <ac:chgData name="Andrea Evrard Comas" userId="133e4c92-0019-454e-a908-a8ccb959cd34" providerId="ADAL" clId="{3D15CFF1-666B-4737-9425-6893B30B20E0}" dt="2022-11-24T09:32:38.873" v="18"/>
+          <ac:spMkLst>
+            <pc:docMk/>
+            <pc:sldMk cId="2204397293" sldId="2147470734"/>
+            <ac:spMk id="18" creationId="{93FC42DE-4203-4227-B45B-C0D72BBFD2D7}"/>
+          </ac:spMkLst>
+        </pc:spChg>
+        <pc:spChg chg="mod">
+          <ac:chgData name="Andrea Evrard Comas" userId="133e4c92-0019-454e-a908-a8ccb959cd34" providerId="ADAL" clId="{3D15CFF1-666B-4737-9425-6893B30B20E0}" dt="2022-11-24T09:32:38.873" v="18"/>
+          <ac:spMkLst>
+            <pc:docMk/>
+            <pc:sldMk cId="2204397293" sldId="2147470734"/>
+            <ac:spMk id="19" creationId="{D339A350-7F94-4D73-A450-A604A4AEC323}"/>
+          </ac:spMkLst>
+        </pc:spChg>
+        <pc:spChg chg="del mod">
+          <ac:chgData name="Andrea Evrard Comas" userId="133e4c92-0019-454e-a908-a8ccb959cd34" providerId="ADAL" clId="{3D15CFF1-666B-4737-9425-6893B30B20E0}" dt="2022-11-24T09:33:09.474" v="30" actId="478"/>
+          <ac:spMkLst>
+            <pc:docMk/>
+            <pc:sldMk cId="2204397293" sldId="2147470734"/>
+            <ac:spMk id="20" creationId="{0D680184-0848-47F1-BF8E-F0C7F384865E}"/>
+          </ac:spMkLst>
+        </pc:spChg>
+        <pc:spChg chg="del mod">
+          <ac:chgData name="Andrea Evrard Comas" userId="133e4c92-0019-454e-a908-a8ccb959cd34" providerId="ADAL" clId="{3D15CFF1-666B-4737-9425-6893B30B20E0}" dt="2022-11-24T09:33:07.974" v="29" actId="478"/>
+          <ac:spMkLst>
+            <pc:docMk/>
+            <pc:sldMk cId="2204397293" sldId="2147470734"/>
+            <ac:spMk id="21" creationId="{681B60F6-0902-4079-BCFA-38C7BE554D31}"/>
+          </ac:spMkLst>
+        </pc:spChg>
+        <pc:spChg chg="mod">
+          <ac:chgData name="Andrea Evrard Comas" userId="133e4c92-0019-454e-a908-a8ccb959cd34" providerId="ADAL" clId="{3D15CFF1-666B-4737-9425-6893B30B20E0}" dt="2022-11-24T09:36:40.485" v="113" actId="688"/>
+          <ac:spMkLst>
+            <pc:docMk/>
+            <pc:sldMk cId="2204397293" sldId="2147470734"/>
+            <ac:spMk id="22" creationId="{8BD9E2BF-0865-4DC2-830E-F24AC05D7B3A}"/>
+          </ac:spMkLst>
+        </pc:spChg>
+        <pc:spChg chg="mod">
+          <ac:chgData name="Andrea Evrard Comas" userId="133e4c92-0019-454e-a908-a8ccb959cd34" providerId="ADAL" clId="{3D15CFF1-666B-4737-9425-6893B30B20E0}" dt="2022-11-24T09:36:53.661" v="118" actId="1036"/>
+          <ac:spMkLst>
+            <pc:docMk/>
+            <pc:sldMk cId="2204397293" sldId="2147470734"/>
+            <ac:spMk id="23" creationId="{C646D548-F87B-4103-8DEA-D7EEFF11695D}"/>
+          </ac:spMkLst>
+        </pc:spChg>
+        <pc:spChg chg="mod">
+          <ac:chgData name="Andrea Evrard Comas" userId="133e4c92-0019-454e-a908-a8ccb959cd34" providerId="ADAL" clId="{3D15CFF1-666B-4737-9425-6893B30B20E0}" dt="2022-11-24T09:36:23.627" v="97" actId="688"/>
+          <ac:spMkLst>
+            <pc:docMk/>
+            <pc:sldMk cId="2204397293" sldId="2147470734"/>
+            <ac:spMk id="24" creationId="{C4718D75-BC9E-4501-9449-74ECCFE64FC1}"/>
+          </ac:spMkLst>
+        </pc:spChg>
+        <pc:spChg chg="mod">
+          <ac:chgData name="Andrea Evrard Comas" userId="133e4c92-0019-454e-a908-a8ccb959cd34" providerId="ADAL" clId="{3D15CFF1-666B-4737-9425-6893B30B20E0}" dt="2022-11-24T09:36:34.202" v="112" actId="1036"/>
+          <ac:spMkLst>
+            <pc:docMk/>
+            <pc:sldMk cId="2204397293" sldId="2147470734"/>
+            <ac:spMk id="25" creationId="{34C9E9D7-A739-4FF0-BAEE-3A7E44992BB9}"/>
+          </ac:spMkLst>
+        </pc:spChg>
+        <pc:grpChg chg="mod">
+          <ac:chgData name="Andrea Evrard Comas" userId="133e4c92-0019-454e-a908-a8ccb959cd34" providerId="ADAL" clId="{3D15CFF1-666B-4737-9425-6893B30B20E0}" dt="2022-11-24T09:32:38.873" v="18"/>
+          <ac:grpSpMkLst>
+            <pc:docMk/>
+            <pc:sldMk cId="2204397293" sldId="2147470734"/>
+            <ac:grpSpMk id="1" creationId="{00000000-0000-0000-0000-000000000000}"/>
+          </ac:grpSpMkLst>
+        </pc:grpChg>
+        <pc:grpChg chg="mod">
+          <ac:chgData name="Andrea Evrard Comas" userId="133e4c92-0019-454e-a908-a8ccb959cd34" providerId="ADAL" clId="{3D15CFF1-666B-4737-9425-6893B30B20E0}" dt="2022-11-24T09:32:38.873" v="18"/>
+          <ac:grpSpMkLst>
+            <pc:docMk/>
+            <pc:sldMk cId="2204397293" sldId="2147470734"/>
+            <ac:grpSpMk id="6" creationId="{3D4AAD72-0089-43ED-85F0-140C0F296BAA}"/>
+          </ac:grpSpMkLst>
+        </pc:grpChg>
+        <pc:grpChg chg="mod">
+          <ac:chgData name="Andrea Evrard Comas" userId="133e4c92-0019-454e-a908-a8ccb959cd34" providerId="ADAL" clId="{3D15CFF1-666B-4737-9425-6893B30B20E0}" dt="2022-11-24T09:36:06.373" v="94" actId="1035"/>
+          <ac:grpSpMkLst>
+            <pc:docMk/>
+            <pc:sldMk cId="2204397293" sldId="2147470734"/>
+            <ac:grpSpMk id="16" creationId="{95D761E8-82C1-4D75-AE5F-EA27F3684FA2}"/>
+          </ac:grpSpMkLst>
+        </pc:grpChg>
+        <pc:graphicFrameChg chg="mod">
+          <ac:chgData name="Andrea Evrard Comas" userId="133e4c92-0019-454e-a908-a8ccb959cd34" providerId="ADAL" clId="{3D15CFF1-666B-4737-9425-6893B30B20E0}" dt="2022-11-24T09:36:00.797" v="86"/>
+          <ac:graphicFrameMkLst>
+            <pc:docMk/>
+            <pc:sldMk cId="2204397293" sldId="2147470734"/>
+            <ac:graphicFrameMk id="4" creationId="{8151242A-E4F1-4B89-A511-5D7392C89FB6}"/>
+          </ac:graphicFrameMkLst>
+        </pc:graphicFrameChg>
+        <pc:picChg chg="mod">
+          <ac:chgData name="Andrea Evrard Comas" userId="133e4c92-0019-454e-a908-a8ccb959cd34" providerId="ADAL" clId="{3D15CFF1-666B-4737-9425-6893B30B20E0}" dt="2022-11-24T09:32:38.873" v="18"/>
+          <ac:picMkLst>
+            <pc:docMk/>
+            <pc:sldMk cId="2204397293" sldId="2147470734"/>
+            <ac:picMk id="3" creationId="{EA998E67-DFD4-4493-B583-1D39295B2F4B}"/>
           </ac:picMkLst>
         </pc:picChg>
       </pc:sldChg>
@@ -8160,7 +8454,7 @@
             </p:custDataLst>
             <p:extLst>
               <p:ext uri="{D42A27DB-BD31-4B8C-83A1-F6EECF244321}">
-                <p14:modId xmlns:p14="http://schemas.microsoft.com/office/powerpoint/2010/main" val="1065387895"/>
+                <p14:modId xmlns:p14="http://schemas.microsoft.com/office/powerpoint/2010/main" val="1048315548"/>
               </p:ext>
             </p:extLst>
           </p:nvPr>
@@ -8355,46 +8649,6 @@
       </p:grpSp>
       <p:sp>
         <p:nvSpPr>
-          <p:cNvPr id="2" name="Title 1">
-            <a:extLst>
-              <a:ext uri="{FF2B5EF4-FFF2-40B4-BE49-F238E27FC236}">
-                <a16:creationId xmlns:a16="http://schemas.microsoft.com/office/drawing/2014/main" id="{F4AD2E94-4B9B-405A-A936-FFA4D1ED2862}"/>
-              </a:ext>
-            </a:extLst>
-          </p:cNvPr>
-          <p:cNvSpPr>
-            <a:spLocks noGrp="1"/>
-          </p:cNvSpPr>
-          <p:nvPr>
-            <p:ph type="title"/>
-          </p:nvPr>
-        </p:nvSpPr>
-        <p:spPr>
-          <a:xfrm>
-            <a:off x="1663335" y="1404708"/>
-            <a:ext cx="1207957" cy="722855"/>
-          </a:xfrm>
-          <a:effectLst>
-            <a:outerShdw blurRad="50800" dist="38100" dir="2700000" algn="tl" rotWithShape="0">
-              <a:prstClr val="black">
-                <a:alpha val="40000"/>
-              </a:prstClr>
-            </a:outerShdw>
-          </a:effectLst>
-        </p:spPr>
-        <p:txBody>
-          <a:bodyPr vert="horz"/>
-          <a:lstStyle/>
-          <a:p>
-            <a:r>
-              <a:rPr lang="de-CH" sz="8000"/>
-              <a:t>1</a:t>
-            </a:r>
-          </a:p>
-        </p:txBody>
-      </p:sp>
-      <p:sp>
-        <p:nvSpPr>
           <p:cNvPr id="9" name="Title 1">
             <a:extLst>
               <a:ext uri="{FF2B5EF4-FFF2-40B4-BE49-F238E27FC236}">
@@ -8466,8 +8720,8 @@
         </p:nvSpPr>
         <p:spPr>
           <a:xfrm>
-            <a:off x="2511765" y="1404708"/>
-            <a:ext cx="3169920" cy="722855"/>
+            <a:off x="2452524" y="1065284"/>
+            <a:ext cx="8235004" cy="722855"/>
           </a:xfrm>
           <a:prstGeom prst="rect">
             <a:avLst/>
@@ -8510,70 +8764,6 @@
       </p:sp>
       <p:sp>
         <p:nvSpPr>
-          <p:cNvPr id="13" name="Title 1">
-            <a:extLst>
-              <a:ext uri="{FF2B5EF4-FFF2-40B4-BE49-F238E27FC236}">
-                <a16:creationId xmlns:a16="http://schemas.microsoft.com/office/drawing/2014/main" id="{0D615A52-C2E4-4112-A794-3C231E76D35A}"/>
-              </a:ext>
-            </a:extLst>
-          </p:cNvPr>
-          <p:cNvSpPr txBox="1">
-            <a:spLocks/>
-          </p:cNvSpPr>
-          <p:nvPr/>
-        </p:nvSpPr>
-        <p:spPr>
-          <a:xfrm>
-            <a:off x="6102335" y="1404708"/>
-            <a:ext cx="1207957" cy="722855"/>
-          </a:xfrm>
-          <a:prstGeom prst="rect">
-            <a:avLst/>
-          </a:prstGeom>
-          <a:ln>
-            <a:noFill/>
-          </a:ln>
-          <a:effectLst>
-            <a:outerShdw blurRad="50800" dist="38100" dir="2700000" algn="tl" rotWithShape="0">
-              <a:prstClr val="black">
-                <a:alpha val="40000"/>
-              </a:prstClr>
-            </a:outerShdw>
-          </a:effectLst>
-        </p:spPr>
-        <p:txBody>
-          <a:bodyPr vert="horz" lIns="91440" tIns="45720" rIns="91440" bIns="45720" rtlCol="0" anchor="ctr">
-            <a:noAutofit/>
-          </a:bodyPr>
-          <a:lstStyle>
-            <a:lvl1pPr algn="l" defTabSz="458694" rtl="0" eaLnBrk="1" latinLnBrk="0" hangingPunct="1">
-              <a:lnSpc>
-                <a:spcPct val="85000"/>
-              </a:lnSpc>
-              <a:spcBef>
-                <a:spcPct val="0"/>
-              </a:spcBef>
-              <a:buNone/>
-              <a:defRPr sz="1800" b="1" i="0" kern="1200">
-                <a:solidFill>
-                  <a:schemeClr val="bg1"/>
-                </a:solidFill>
-                <a:latin typeface="EYInterstate" panose="02000503020000020004" pitchFamily="2" charset="0"/>
-                <a:ea typeface="+mj-ea"/>
-                <a:cs typeface="Arial" pitchFamily="34" charset="0"/>
-              </a:defRPr>
-            </a:lvl1pPr>
-          </a:lstStyle>
-          <a:p>
-            <a:r>
-              <a:rPr lang="de-CH" sz="8000"/>
-              <a:t>2</a:t>
-            </a:r>
-          </a:p>
-        </p:txBody>
-      </p:sp>
-      <p:sp>
-        <p:nvSpPr>
           <p:cNvPr id="14" name="Title 1">
             <a:extLst>
               <a:ext uri="{FF2B5EF4-FFF2-40B4-BE49-F238E27FC236}">
@@ -8588,8 +8778,8 @@
         </p:nvSpPr>
         <p:spPr>
           <a:xfrm>
-            <a:off x="7026265" y="1404708"/>
-            <a:ext cx="3749040" cy="722855"/>
+            <a:off x="2452524" y="1866387"/>
+            <a:ext cx="9739476" cy="722855"/>
           </a:xfrm>
           <a:prstGeom prst="rect">
             <a:avLst/>
@@ -8706,10 +8896,1013 @@
           </a:p>
         </p:txBody>
       </p:sp>
+      <p:grpSp>
+        <p:nvGrpSpPr>
+          <p:cNvPr id="16" name="Group 15">
+            <a:extLst>
+              <a:ext uri="{FF2B5EF4-FFF2-40B4-BE49-F238E27FC236}">
+                <a16:creationId xmlns:a16="http://schemas.microsoft.com/office/drawing/2014/main" id="{95D761E8-82C1-4D75-AE5F-EA27F3684FA2}"/>
+              </a:ext>
+            </a:extLst>
+          </p:cNvPr>
+          <p:cNvGrpSpPr/>
+          <p:nvPr/>
+        </p:nvGrpSpPr>
+        <p:grpSpPr>
+          <a:xfrm>
+            <a:off x="622607" y="1181983"/>
+            <a:ext cx="1723417" cy="1322052"/>
+            <a:chOff x="1976584" y="2211897"/>
+            <a:chExt cx="4398334" cy="3374007"/>
+          </a:xfrm>
+        </p:grpSpPr>
+        <p:sp>
+          <p:nvSpPr>
+            <p:cNvPr id="17" name="Freeform 1">
+              <a:extLst>
+                <a:ext uri="{FF2B5EF4-FFF2-40B4-BE49-F238E27FC236}">
+                  <a16:creationId xmlns:a16="http://schemas.microsoft.com/office/drawing/2014/main" id="{3915212E-BCC3-41DA-B16A-EF304E6B0EA0}"/>
+                </a:ext>
+              </a:extLst>
+            </p:cNvPr>
+            <p:cNvSpPr>
+              <a:spLocks noChangeArrowheads="1"/>
+            </p:cNvSpPr>
+            <p:nvPr/>
+          </p:nvSpPr>
+          <p:spPr bwMode="auto">
+            <a:xfrm>
+              <a:off x="2187466" y="2422665"/>
+              <a:ext cx="2952891" cy="2952890"/>
+            </a:xfrm>
+            <a:custGeom>
+              <a:avLst/>
+              <a:gdLst>
+                <a:gd name="T0" fmla="*/ 5571 w 11134"/>
+                <a:gd name="T1" fmla="*/ 11132 h 11134"/>
+                <a:gd name="T2" fmla="*/ 5571 w 11134"/>
+                <a:gd name="T3" fmla="*/ 11132 h 11134"/>
+                <a:gd name="T4" fmla="*/ 11131 w 11134"/>
+                <a:gd name="T5" fmla="*/ 5563 h 11134"/>
+                <a:gd name="T6" fmla="*/ 11131 w 11134"/>
+                <a:gd name="T7" fmla="*/ 5563 h 11134"/>
+                <a:gd name="T8" fmla="*/ 5563 w 11134"/>
+                <a:gd name="T9" fmla="*/ 3 h 11134"/>
+                <a:gd name="T10" fmla="*/ 5563 w 11134"/>
+                <a:gd name="T11" fmla="*/ 3 h 11134"/>
+                <a:gd name="T12" fmla="*/ 2 w 11134"/>
+                <a:gd name="T13" fmla="*/ 5571 h 11134"/>
+                <a:gd name="T14" fmla="*/ 2 w 11134"/>
+                <a:gd name="T15" fmla="*/ 5571 h 11134"/>
+                <a:gd name="T16" fmla="*/ 5571 w 11134"/>
+                <a:gd name="T17" fmla="*/ 11132 h 11134"/>
+              </a:gdLst>
+              <a:ahLst/>
+              <a:cxnLst>
+                <a:cxn ang="0">
+                  <a:pos x="T0" y="T1"/>
+                </a:cxn>
+                <a:cxn ang="0">
+                  <a:pos x="T2" y="T3"/>
+                </a:cxn>
+                <a:cxn ang="0">
+                  <a:pos x="T4" y="T5"/>
+                </a:cxn>
+                <a:cxn ang="0">
+                  <a:pos x="T6" y="T7"/>
+                </a:cxn>
+                <a:cxn ang="0">
+                  <a:pos x="T8" y="T9"/>
+                </a:cxn>
+                <a:cxn ang="0">
+                  <a:pos x="T10" y="T11"/>
+                </a:cxn>
+                <a:cxn ang="0">
+                  <a:pos x="T12" y="T13"/>
+                </a:cxn>
+                <a:cxn ang="0">
+                  <a:pos x="T14" y="T15"/>
+                </a:cxn>
+                <a:cxn ang="0">
+                  <a:pos x="T16" y="T17"/>
+                </a:cxn>
+              </a:cxnLst>
+              <a:rect l="0" t="0" r="r" b="b"/>
+              <a:pathLst>
+                <a:path w="11134" h="11134">
+                  <a:moveTo>
+                    <a:pt x="5571" y="11132"/>
+                  </a:moveTo>
+                  <a:lnTo>
+                    <a:pt x="5571" y="11132"/>
+                  </a:lnTo>
+                  <a:cubicBezTo>
+                    <a:pt x="8644" y="11128"/>
+                    <a:pt x="11133" y="8636"/>
+                    <a:pt x="11131" y="5563"/>
+                  </a:cubicBezTo>
+                  <a:lnTo>
+                    <a:pt x="11131" y="5563"/>
+                  </a:lnTo>
+                  <a:cubicBezTo>
+                    <a:pt x="11129" y="2489"/>
+                    <a:pt x="8635" y="0"/>
+                    <a:pt x="5563" y="3"/>
+                  </a:cubicBezTo>
+                  <a:lnTo>
+                    <a:pt x="5563" y="3"/>
+                  </a:lnTo>
+                  <a:cubicBezTo>
+                    <a:pt x="2491" y="5"/>
+                    <a:pt x="0" y="2498"/>
+                    <a:pt x="2" y="5571"/>
+                  </a:cubicBezTo>
+                  <a:lnTo>
+                    <a:pt x="2" y="5571"/>
+                  </a:lnTo>
+                  <a:cubicBezTo>
+                    <a:pt x="4" y="8644"/>
+                    <a:pt x="2498" y="11133"/>
+                    <a:pt x="5571" y="11132"/>
+                  </a:cubicBezTo>
+                </a:path>
+              </a:pathLst>
+            </a:custGeom>
+            <a:solidFill>
+              <a:schemeClr val="tx1"/>
+            </a:solidFill>
+            <a:ln>
+              <a:noFill/>
+            </a:ln>
+            <a:effectLst/>
+          </p:spPr>
+          <p:txBody>
+            <a:bodyPr wrap="none" anchor="ctr"/>
+            <a:lstStyle/>
+            <a:p>
+              <a:pPr defTabSz="743076"/>
+              <a:endParaRPr lang="en-US" sz="2655">
+                <a:solidFill>
+                  <a:srgbClr val="7F7F7F"/>
+                </a:solidFill>
+                <a:latin typeface="Lato Light" panose="020F0502020204030203" pitchFamily="34" charset="0"/>
+              </a:endParaRPr>
+            </a:p>
+          </p:txBody>
+        </p:sp>
+        <p:sp>
+          <p:nvSpPr>
+            <p:cNvPr id="18" name="Freeform 2">
+              <a:extLst>
+                <a:ext uri="{FF2B5EF4-FFF2-40B4-BE49-F238E27FC236}">
+                  <a16:creationId xmlns:a16="http://schemas.microsoft.com/office/drawing/2014/main" id="{93FC42DE-4203-4227-B45B-C0D72BBFD2D7}"/>
+                </a:ext>
+              </a:extLst>
+            </p:cNvPr>
+            <p:cNvSpPr>
+              <a:spLocks noChangeArrowheads="1"/>
+            </p:cNvSpPr>
+            <p:nvPr/>
+          </p:nvSpPr>
+          <p:spPr bwMode="auto">
+            <a:xfrm>
+              <a:off x="3662154" y="2211897"/>
+              <a:ext cx="1687642" cy="3374006"/>
+            </a:xfrm>
+            <a:custGeom>
+              <a:avLst/>
+              <a:gdLst>
+                <a:gd name="connsiteX0" fmla="*/ 2882 w 4156546"/>
+                <a:gd name="connsiteY0" fmla="*/ 3371527 h 8309941"/>
+                <a:gd name="connsiteX1" fmla="*/ 785018 w 4156546"/>
+                <a:gd name="connsiteY1" fmla="*/ 4150918 h 8309941"/>
+                <a:gd name="connsiteX2" fmla="*/ 3535 w 4156546"/>
+                <a:gd name="connsiteY2" fmla="*/ 4934226 h 8309941"/>
+                <a:gd name="connsiteX3" fmla="*/ 2 w 4156546"/>
+                <a:gd name="connsiteY3" fmla="*/ 1695844 h 8309941"/>
+                <a:gd name="connsiteX4" fmla="*/ 2461354 w 4156546"/>
+                <a:gd name="connsiteY4" fmla="*/ 4153009 h 8309941"/>
+                <a:gd name="connsiteX5" fmla="*/ 3268 w 4156546"/>
+                <a:gd name="connsiteY5" fmla="*/ 6613440 h 8309941"/>
+                <a:gd name="connsiteX6" fmla="*/ 2615 w 4156546"/>
+                <a:gd name="connsiteY6" fmla="*/ 5668729 h 8309941"/>
+                <a:gd name="connsiteX7" fmla="*/ 1516791 w 4156546"/>
+                <a:gd name="connsiteY7" fmla="*/ 4153663 h 8309941"/>
+                <a:gd name="connsiteX8" fmla="*/ 655 w 4156546"/>
+                <a:gd name="connsiteY8" fmla="*/ 2639249 h 8309941"/>
+                <a:gd name="connsiteX9" fmla="*/ 0 w 4156546"/>
+                <a:gd name="connsiteY9" fmla="*/ 1 h 8309941"/>
+                <a:gd name="connsiteX10" fmla="*/ 4156545 w 4156546"/>
+                <a:gd name="connsiteY10" fmla="*/ 4152031 h 8309941"/>
+                <a:gd name="connsiteX11" fmla="*/ 5877 w 4156546"/>
+                <a:gd name="connsiteY11" fmla="*/ 8309941 h 8309941"/>
+                <a:gd name="connsiteX12" fmla="*/ 4571 w 4156546"/>
+                <a:gd name="connsiteY12" fmla="*/ 7365348 h 8309941"/>
+                <a:gd name="connsiteX13" fmla="*/ 3212914 w 4156546"/>
+                <a:gd name="connsiteY13" fmla="*/ 4153338 h 8309941"/>
+                <a:gd name="connsiteX14" fmla="*/ 0 w 4156546"/>
+                <a:gd name="connsiteY14" fmla="*/ 943288 h 8309941"/>
+              </a:gdLst>
+              <a:ahLst/>
+              <a:cxnLst>
+                <a:cxn ang="0">
+                  <a:pos x="connsiteX0" y="connsiteY0"/>
+                </a:cxn>
+                <a:cxn ang="0">
+                  <a:pos x="connsiteX1" y="connsiteY1"/>
+                </a:cxn>
+                <a:cxn ang="0">
+                  <a:pos x="connsiteX2" y="connsiteY2"/>
+                </a:cxn>
+                <a:cxn ang="0">
+                  <a:pos x="connsiteX3" y="connsiteY3"/>
+                </a:cxn>
+                <a:cxn ang="0">
+                  <a:pos x="connsiteX4" y="connsiteY4"/>
+                </a:cxn>
+                <a:cxn ang="0">
+                  <a:pos x="connsiteX5" y="connsiteY5"/>
+                </a:cxn>
+                <a:cxn ang="0">
+                  <a:pos x="connsiteX6" y="connsiteY6"/>
+                </a:cxn>
+                <a:cxn ang="0">
+                  <a:pos x="connsiteX7" y="connsiteY7"/>
+                </a:cxn>
+                <a:cxn ang="0">
+                  <a:pos x="connsiteX8" y="connsiteY8"/>
+                </a:cxn>
+                <a:cxn ang="0">
+                  <a:pos x="connsiteX9" y="connsiteY9"/>
+                </a:cxn>
+                <a:cxn ang="0">
+                  <a:pos x="connsiteX10" y="connsiteY10"/>
+                </a:cxn>
+                <a:cxn ang="0">
+                  <a:pos x="connsiteX11" y="connsiteY11"/>
+                </a:cxn>
+                <a:cxn ang="0">
+                  <a:pos x="connsiteX12" y="connsiteY12"/>
+                </a:cxn>
+                <a:cxn ang="0">
+                  <a:pos x="connsiteX13" y="connsiteY13"/>
+                </a:cxn>
+                <a:cxn ang="0">
+                  <a:pos x="connsiteX14" y="connsiteY14"/>
+                </a:cxn>
+              </a:cxnLst>
+              <a:rect l="l" t="t" r="r" b="b"/>
+              <a:pathLst>
+                <a:path w="4156546" h="8309941">
+                  <a:moveTo>
+                    <a:pt x="2882" y="3371527"/>
+                  </a:moveTo>
+                  <a:cubicBezTo>
+                    <a:pt x="435081" y="3370874"/>
+                    <a:pt x="784365" y="3719446"/>
+                    <a:pt x="785018" y="4150918"/>
+                  </a:cubicBezTo>
+                  <a:cubicBezTo>
+                    <a:pt x="785671" y="4583043"/>
+                    <a:pt x="436387" y="4934226"/>
+                    <a:pt x="3535" y="4934226"/>
+                  </a:cubicBezTo>
+                  <a:close/>
+                  <a:moveTo>
+                    <a:pt x="2" y="1695844"/>
+                  </a:moveTo>
+                  <a:cubicBezTo>
+                    <a:pt x="1355444" y="1694538"/>
+                    <a:pt x="2460701" y="2796701"/>
+                    <a:pt x="2461354" y="4153009"/>
+                  </a:cubicBezTo>
+                  <a:cubicBezTo>
+                    <a:pt x="2462008" y="5507357"/>
+                    <a:pt x="1359364" y="6612788"/>
+                    <a:pt x="3268" y="6613440"/>
+                  </a:cubicBezTo>
+                  <a:lnTo>
+                    <a:pt x="2615" y="5668729"/>
+                  </a:lnTo>
+                  <a:cubicBezTo>
+                    <a:pt x="839396" y="5668076"/>
+                    <a:pt x="1517444" y="4989269"/>
+                    <a:pt x="1516791" y="4153663"/>
+                  </a:cubicBezTo>
+                  <a:cubicBezTo>
+                    <a:pt x="1515484" y="3316750"/>
+                    <a:pt x="837437" y="2638596"/>
+                    <a:pt x="655" y="2639249"/>
+                  </a:cubicBezTo>
+                  <a:close/>
+                  <a:moveTo>
+                    <a:pt x="0" y="1"/>
+                  </a:moveTo>
+                  <a:cubicBezTo>
+                    <a:pt x="2290834" y="-1959"/>
+                    <a:pt x="4154586" y="1860445"/>
+                    <a:pt x="4156545" y="4152031"/>
+                  </a:cubicBezTo>
+                  <a:cubicBezTo>
+                    <a:pt x="4158504" y="6442964"/>
+                    <a:pt x="2296712" y="8308634"/>
+                    <a:pt x="5877" y="8309941"/>
+                  </a:cubicBezTo>
+                  <a:lnTo>
+                    <a:pt x="4571" y="7365348"/>
+                  </a:lnTo>
+                  <a:cubicBezTo>
+                    <a:pt x="1774939" y="7364041"/>
+                    <a:pt x="3214220" y="5922980"/>
+                    <a:pt x="3212914" y="4153338"/>
+                  </a:cubicBezTo>
+                  <a:cubicBezTo>
+                    <a:pt x="3210956" y="2381735"/>
+                    <a:pt x="1770368" y="941981"/>
+                    <a:pt x="0" y="943288"/>
+                  </a:cubicBezTo>
+                  <a:close/>
+                </a:path>
+              </a:pathLst>
+            </a:custGeom>
+            <a:solidFill>
+              <a:schemeClr val="accent3"/>
+            </a:solidFill>
+            <a:ln>
+              <a:noFill/>
+            </a:ln>
+            <a:effectLst/>
+          </p:spPr>
+          <p:txBody>
+            <a:bodyPr wrap="square" anchor="ctr">
+              <a:noAutofit/>
+            </a:bodyPr>
+            <a:lstStyle/>
+            <a:p>
+              <a:pPr defTabSz="743076"/>
+              <a:endParaRPr lang="en-US" sz="2655">
+                <a:solidFill>
+                  <a:srgbClr val="7F7F7F"/>
+                </a:solidFill>
+                <a:latin typeface="Lato Light" panose="020F0502020204030203" pitchFamily="34" charset="0"/>
+              </a:endParaRPr>
+            </a:p>
+          </p:txBody>
+        </p:sp>
+        <p:sp>
+          <p:nvSpPr>
+            <p:cNvPr id="19" name="Freeform 3">
+              <a:extLst>
+                <a:ext uri="{FF2B5EF4-FFF2-40B4-BE49-F238E27FC236}">
+                  <a16:creationId xmlns:a16="http://schemas.microsoft.com/office/drawing/2014/main" id="{D339A350-7F94-4D73-A450-A604A4AEC323}"/>
+                </a:ext>
+              </a:extLst>
+            </p:cNvPr>
+            <p:cNvSpPr>
+              <a:spLocks noChangeArrowheads="1"/>
+            </p:cNvSpPr>
+            <p:nvPr/>
+          </p:nvSpPr>
+          <p:spPr bwMode="auto">
+            <a:xfrm>
+              <a:off x="1976584" y="2212163"/>
+              <a:ext cx="1688812" cy="3373741"/>
+            </a:xfrm>
+            <a:custGeom>
+              <a:avLst/>
+              <a:gdLst>
+                <a:gd name="connsiteX0" fmla="*/ 4153013 w 4159426"/>
+                <a:gd name="connsiteY0" fmla="*/ 3372833 h 8309289"/>
+                <a:gd name="connsiteX1" fmla="*/ 4153667 w 4159426"/>
+                <a:gd name="connsiteY1" fmla="*/ 4936185 h 8309289"/>
+                <a:gd name="connsiteX2" fmla="*/ 3370878 w 4159426"/>
+                <a:gd name="connsiteY2" fmla="*/ 4153856 h 8309289"/>
+                <a:gd name="connsiteX3" fmla="*/ 4153013 w 4159426"/>
+                <a:gd name="connsiteY3" fmla="*/ 3372833 h 8309289"/>
+                <a:gd name="connsiteX4" fmla="*/ 4150404 w 4159426"/>
+                <a:gd name="connsiteY4" fmla="*/ 1696497 h 8309289"/>
+                <a:gd name="connsiteX5" fmla="*/ 4151057 w 4159426"/>
+                <a:gd name="connsiteY5" fmla="*/ 2639475 h 8309289"/>
+                <a:gd name="connsiteX6" fmla="*/ 2639808 w 4159426"/>
+                <a:gd name="connsiteY6" fmla="*/ 4155162 h 8309289"/>
+                <a:gd name="connsiteX7" fmla="*/ 4153016 w 4159426"/>
+                <a:gd name="connsiteY7" fmla="*/ 5667584 h 8309289"/>
+                <a:gd name="connsiteX8" fmla="*/ 4153668 w 4159426"/>
+                <a:gd name="connsiteY8" fmla="*/ 6611868 h 8309289"/>
+                <a:gd name="connsiteX9" fmla="*/ 1695196 w 4159426"/>
+                <a:gd name="connsiteY9" fmla="*/ 4156468 h 8309289"/>
+                <a:gd name="connsiteX10" fmla="*/ 4150404 w 4159426"/>
+                <a:gd name="connsiteY10" fmla="*/ 1696497 h 8309289"/>
+                <a:gd name="connsiteX11" fmla="*/ 4152893 w 4159426"/>
+                <a:gd name="connsiteY11" fmla="*/ 0 h 8309289"/>
+                <a:gd name="connsiteX12" fmla="*/ 4153546 w 4159426"/>
+                <a:gd name="connsiteY12" fmla="*/ 943213 h 8309289"/>
+                <a:gd name="connsiteX13" fmla="*/ 944791 w 4159426"/>
+                <a:gd name="connsiteY13" fmla="*/ 4157583 h 8309289"/>
+                <a:gd name="connsiteX14" fmla="*/ 4158120 w 4159426"/>
+                <a:gd name="connsiteY14" fmla="*/ 7364768 h 8309289"/>
+                <a:gd name="connsiteX15" fmla="*/ 4159426 w 4159426"/>
+                <a:gd name="connsiteY15" fmla="*/ 8309287 h 8309289"/>
+                <a:gd name="connsiteX16" fmla="*/ 2 w 4159426"/>
+                <a:gd name="connsiteY16" fmla="*/ 4157583 h 8309289"/>
+                <a:gd name="connsiteX17" fmla="*/ 4152893 w 4159426"/>
+                <a:gd name="connsiteY17" fmla="*/ 0 h 8309289"/>
+              </a:gdLst>
+              <a:ahLst/>
+              <a:cxnLst>
+                <a:cxn ang="0">
+                  <a:pos x="connsiteX0" y="connsiteY0"/>
+                </a:cxn>
+                <a:cxn ang="0">
+                  <a:pos x="connsiteX1" y="connsiteY1"/>
+                </a:cxn>
+                <a:cxn ang="0">
+                  <a:pos x="connsiteX2" y="connsiteY2"/>
+                </a:cxn>
+                <a:cxn ang="0">
+                  <a:pos x="connsiteX3" y="connsiteY3"/>
+                </a:cxn>
+                <a:cxn ang="0">
+                  <a:pos x="connsiteX4" y="connsiteY4"/>
+                </a:cxn>
+                <a:cxn ang="0">
+                  <a:pos x="connsiteX5" y="connsiteY5"/>
+                </a:cxn>
+                <a:cxn ang="0">
+                  <a:pos x="connsiteX6" y="connsiteY6"/>
+                </a:cxn>
+                <a:cxn ang="0">
+                  <a:pos x="connsiteX7" y="connsiteY7"/>
+                </a:cxn>
+                <a:cxn ang="0">
+                  <a:pos x="connsiteX8" y="connsiteY8"/>
+                </a:cxn>
+                <a:cxn ang="0">
+                  <a:pos x="connsiteX9" y="connsiteY9"/>
+                </a:cxn>
+                <a:cxn ang="0">
+                  <a:pos x="connsiteX10" y="connsiteY10"/>
+                </a:cxn>
+                <a:cxn ang="0">
+                  <a:pos x="connsiteX11" y="connsiteY11"/>
+                </a:cxn>
+                <a:cxn ang="0">
+                  <a:pos x="connsiteX12" y="connsiteY12"/>
+                </a:cxn>
+                <a:cxn ang="0">
+                  <a:pos x="connsiteX13" y="connsiteY13"/>
+                </a:cxn>
+                <a:cxn ang="0">
+                  <a:pos x="connsiteX14" y="connsiteY14"/>
+                </a:cxn>
+                <a:cxn ang="0">
+                  <a:pos x="connsiteX15" y="connsiteY15"/>
+                </a:cxn>
+                <a:cxn ang="0">
+                  <a:pos x="connsiteX16" y="connsiteY16"/>
+                </a:cxn>
+                <a:cxn ang="0">
+                  <a:pos x="connsiteX17" y="connsiteY17"/>
+                </a:cxn>
+              </a:cxnLst>
+              <a:rect l="l" t="t" r="r" b="b"/>
+              <a:pathLst>
+                <a:path w="4159426" h="8309289">
+                  <a:moveTo>
+                    <a:pt x="4153013" y="3372833"/>
+                  </a:moveTo>
+                  <a:lnTo>
+                    <a:pt x="4153667" y="4936185"/>
+                  </a:lnTo>
+                  <a:cubicBezTo>
+                    <a:pt x="3722414" y="4936185"/>
+                    <a:pt x="3370878" y="4586161"/>
+                    <a:pt x="3370878" y="4153856"/>
+                  </a:cubicBezTo>
+                  <a:cubicBezTo>
+                    <a:pt x="3370878" y="3722857"/>
+                    <a:pt x="3721761" y="3372833"/>
+                    <a:pt x="4153013" y="3372833"/>
+                  </a:cubicBezTo>
+                  <a:close/>
+                  <a:moveTo>
+                    <a:pt x="4150404" y="1696497"/>
+                  </a:moveTo>
+                  <a:lnTo>
+                    <a:pt x="4151057" y="2639475"/>
+                  </a:lnTo>
+                  <a:cubicBezTo>
+                    <a:pt x="3316116" y="2641434"/>
+                    <a:pt x="2639155" y="3319281"/>
+                    <a:pt x="2639808" y="4155162"/>
+                  </a:cubicBezTo>
+                  <a:cubicBezTo>
+                    <a:pt x="2639808" y="4990390"/>
+                    <a:pt x="3318075" y="5668237"/>
+                    <a:pt x="4153016" y="5667584"/>
+                  </a:cubicBezTo>
+                  <a:lnTo>
+                    <a:pt x="4153668" y="6611868"/>
+                  </a:lnTo>
+                  <a:cubicBezTo>
+                    <a:pt x="2799746" y="6612521"/>
+                    <a:pt x="1695849" y="5510856"/>
+                    <a:pt x="1695196" y="4156468"/>
+                  </a:cubicBezTo>
+                  <a:cubicBezTo>
+                    <a:pt x="1694543" y="2800774"/>
+                    <a:pt x="2796482" y="1697803"/>
+                    <a:pt x="4150404" y="1696497"/>
+                  </a:cubicBezTo>
+                  <a:close/>
+                  <a:moveTo>
+                    <a:pt x="4152893" y="0"/>
+                  </a:moveTo>
+                  <a:lnTo>
+                    <a:pt x="4153546" y="943213"/>
+                  </a:lnTo>
+                  <a:cubicBezTo>
+                    <a:pt x="2383536" y="945173"/>
+                    <a:pt x="943485" y="2386120"/>
+                    <a:pt x="944791" y="4157583"/>
+                  </a:cubicBezTo>
+                  <a:cubicBezTo>
+                    <a:pt x="946098" y="5926433"/>
+                    <a:pt x="2387457" y="7366074"/>
+                    <a:pt x="4158120" y="7364768"/>
+                  </a:cubicBezTo>
+                  <a:lnTo>
+                    <a:pt x="4159426" y="8309287"/>
+                  </a:lnTo>
+                  <a:cubicBezTo>
+                    <a:pt x="1868019" y="8311900"/>
+                    <a:pt x="1962" y="6448336"/>
+                    <a:pt x="2" y="4157583"/>
+                  </a:cubicBezTo>
+                  <a:cubicBezTo>
+                    <a:pt x="-1958" y="1865524"/>
+                    <a:pt x="1861485" y="1960"/>
+                    <a:pt x="4152893" y="0"/>
+                  </a:cubicBezTo>
+                  <a:close/>
+                </a:path>
+              </a:pathLst>
+            </a:custGeom>
+            <a:solidFill>
+              <a:schemeClr val="accent4"/>
+            </a:solidFill>
+            <a:ln>
+              <a:noFill/>
+            </a:ln>
+            <a:effectLst/>
+          </p:spPr>
+          <p:txBody>
+            <a:bodyPr wrap="square" anchor="ctr">
+              <a:noAutofit/>
+            </a:bodyPr>
+            <a:lstStyle/>
+            <a:p>
+              <a:pPr defTabSz="743076"/>
+              <a:endParaRPr lang="en-US" sz="2655">
+                <a:solidFill>
+                  <a:srgbClr val="7F7F7F"/>
+                </a:solidFill>
+                <a:latin typeface="Lato Light" panose="020F0502020204030203" pitchFamily="34" charset="0"/>
+              </a:endParaRPr>
+            </a:p>
+          </p:txBody>
+        </p:sp>
+        <p:sp>
+          <p:nvSpPr>
+            <p:cNvPr id="22" name="Freeform 9">
+              <a:extLst>
+                <a:ext uri="{FF2B5EF4-FFF2-40B4-BE49-F238E27FC236}">
+                  <a16:creationId xmlns:a16="http://schemas.microsoft.com/office/drawing/2014/main" id="{8BD9E2BF-0865-4DC2-830E-F24AC05D7B3A}"/>
+                </a:ext>
+              </a:extLst>
+            </p:cNvPr>
+            <p:cNvSpPr>
+              <a:spLocks noChangeArrowheads="1"/>
+            </p:cNvSpPr>
+            <p:nvPr/>
+          </p:nvSpPr>
+          <p:spPr bwMode="auto">
+            <a:xfrm rot="4149673">
+              <a:off x="4821947" y="2109085"/>
+              <a:ext cx="104820" cy="2274483"/>
+            </a:xfrm>
+            <a:custGeom>
+              <a:avLst/>
+              <a:gdLst>
+                <a:gd name="T0" fmla="*/ 0 w 367"/>
+                <a:gd name="T1" fmla="*/ 250 h 7944"/>
+                <a:gd name="T2" fmla="*/ 0 w 367"/>
+                <a:gd name="T3" fmla="*/ 250 h 7944"/>
+                <a:gd name="T4" fmla="*/ 183 w 367"/>
+                <a:gd name="T5" fmla="*/ 0 h 7944"/>
+                <a:gd name="T6" fmla="*/ 183 w 367"/>
+                <a:gd name="T7" fmla="*/ 0 h 7944"/>
+                <a:gd name="T8" fmla="*/ 366 w 367"/>
+                <a:gd name="T9" fmla="*/ 250 h 7944"/>
+                <a:gd name="T10" fmla="*/ 366 w 367"/>
+                <a:gd name="T11" fmla="*/ 7693 h 7944"/>
+                <a:gd name="T12" fmla="*/ 366 w 367"/>
+                <a:gd name="T13" fmla="*/ 7693 h 7944"/>
+                <a:gd name="T14" fmla="*/ 183 w 367"/>
+                <a:gd name="T15" fmla="*/ 7943 h 7944"/>
+                <a:gd name="T16" fmla="*/ 183 w 367"/>
+                <a:gd name="T17" fmla="*/ 7943 h 7944"/>
+                <a:gd name="T18" fmla="*/ 0 w 367"/>
+                <a:gd name="T19" fmla="*/ 7693 h 7944"/>
+                <a:gd name="T20" fmla="*/ 0 w 367"/>
+                <a:gd name="T21" fmla="*/ 250 h 7944"/>
+              </a:gdLst>
+              <a:ahLst/>
+              <a:cxnLst>
+                <a:cxn ang="0">
+                  <a:pos x="T0" y="T1"/>
+                </a:cxn>
+                <a:cxn ang="0">
+                  <a:pos x="T2" y="T3"/>
+                </a:cxn>
+                <a:cxn ang="0">
+                  <a:pos x="T4" y="T5"/>
+                </a:cxn>
+                <a:cxn ang="0">
+                  <a:pos x="T6" y="T7"/>
+                </a:cxn>
+                <a:cxn ang="0">
+                  <a:pos x="T8" y="T9"/>
+                </a:cxn>
+                <a:cxn ang="0">
+                  <a:pos x="T10" y="T11"/>
+                </a:cxn>
+                <a:cxn ang="0">
+                  <a:pos x="T12" y="T13"/>
+                </a:cxn>
+                <a:cxn ang="0">
+                  <a:pos x="T14" y="T15"/>
+                </a:cxn>
+                <a:cxn ang="0">
+                  <a:pos x="T16" y="T17"/>
+                </a:cxn>
+                <a:cxn ang="0">
+                  <a:pos x="T18" y="T19"/>
+                </a:cxn>
+                <a:cxn ang="0">
+                  <a:pos x="T20" y="T21"/>
+                </a:cxn>
+              </a:cxnLst>
+              <a:rect l="0" t="0" r="r" b="b"/>
+              <a:pathLst>
+                <a:path w="367" h="7944">
+                  <a:moveTo>
+                    <a:pt x="0" y="250"/>
+                  </a:moveTo>
+                  <a:lnTo>
+                    <a:pt x="0" y="250"/>
+                  </a:lnTo>
+                  <a:cubicBezTo>
+                    <a:pt x="0" y="111"/>
+                    <a:pt x="82" y="0"/>
+                    <a:pt x="183" y="0"/>
+                  </a:cubicBezTo>
+                  <a:lnTo>
+                    <a:pt x="183" y="0"/>
+                  </a:lnTo>
+                  <a:cubicBezTo>
+                    <a:pt x="284" y="0"/>
+                    <a:pt x="366" y="111"/>
+                    <a:pt x="366" y="250"/>
+                  </a:cubicBezTo>
+                  <a:lnTo>
+                    <a:pt x="366" y="7693"/>
+                  </a:lnTo>
+                  <a:lnTo>
+                    <a:pt x="366" y="7693"/>
+                  </a:lnTo>
+                  <a:cubicBezTo>
+                    <a:pt x="366" y="7831"/>
+                    <a:pt x="284" y="7943"/>
+                    <a:pt x="183" y="7943"/>
+                  </a:cubicBezTo>
+                  <a:lnTo>
+                    <a:pt x="183" y="7943"/>
+                  </a:lnTo>
+                  <a:cubicBezTo>
+                    <a:pt x="82" y="7943"/>
+                    <a:pt x="0" y="7831"/>
+                    <a:pt x="0" y="7693"/>
+                  </a:cubicBezTo>
+                  <a:lnTo>
+                    <a:pt x="0" y="250"/>
+                  </a:lnTo>
+                </a:path>
+              </a:pathLst>
+            </a:custGeom>
+            <a:solidFill>
+              <a:schemeClr val="accent1"/>
+            </a:solidFill>
+            <a:ln>
+              <a:noFill/>
+            </a:ln>
+            <a:effectLst/>
+          </p:spPr>
+          <p:txBody>
+            <a:bodyPr wrap="none" anchor="ctr"/>
+            <a:lstStyle/>
+            <a:p>
+              <a:pPr defTabSz="743076"/>
+              <a:endParaRPr lang="en-US" sz="2655">
+                <a:solidFill>
+                  <a:srgbClr val="7F7F7F"/>
+                </a:solidFill>
+                <a:latin typeface="Lato Light" panose="020F0502020204030203" pitchFamily="34" charset="0"/>
+              </a:endParaRPr>
+            </a:p>
+          </p:txBody>
+        </p:sp>
+        <p:sp>
+          <p:nvSpPr>
+            <p:cNvPr id="23" name="Teardrop 22">
+              <a:extLst>
+                <a:ext uri="{FF2B5EF4-FFF2-40B4-BE49-F238E27FC236}">
+                  <a16:creationId xmlns:a16="http://schemas.microsoft.com/office/drawing/2014/main" id="{C646D548-F87B-4103-8DEA-D7EEFF11695D}"/>
+                </a:ext>
+              </a:extLst>
+            </p:cNvPr>
+            <p:cNvSpPr>
+              <a:spLocks/>
+            </p:cNvSpPr>
+            <p:nvPr/>
+          </p:nvSpPr>
+          <p:spPr>
+            <a:xfrm rot="2037640">
+              <a:off x="5629684" y="2488404"/>
+              <a:ext cx="745234" cy="787578"/>
+            </a:xfrm>
+            <a:prstGeom prst="teardrop">
+              <a:avLst>
+                <a:gd name="adj" fmla="val 29107"/>
+              </a:avLst>
+            </a:prstGeom>
+            <a:solidFill>
+              <a:schemeClr val="accent1">
+                <a:alpha val="50000"/>
+              </a:schemeClr>
+            </a:solidFill>
+            <a:ln>
+              <a:noFill/>
+            </a:ln>
+          </p:spPr>
+          <p:style>
+            <a:lnRef idx="2">
+              <a:schemeClr val="accent1">
+                <a:shade val="50000"/>
+              </a:schemeClr>
+            </a:lnRef>
+            <a:fillRef idx="1">
+              <a:schemeClr val="accent1"/>
+            </a:fillRef>
+            <a:effectRef idx="0">
+              <a:schemeClr val="accent1"/>
+            </a:effectRef>
+            <a:fontRef idx="minor">
+              <a:schemeClr val="lt1"/>
+            </a:fontRef>
+          </p:style>
+          <p:txBody>
+            <a:bodyPr rtlCol="0" anchor="ctr"/>
+            <a:lstStyle/>
+            <a:p>
+              <a:pPr algn="ctr" defTabSz="743076"/>
+              <a:endParaRPr lang="en-US" sz="1463" dirty="0">
+                <a:solidFill>
+                  <a:srgbClr val="FFFFFF"/>
+                </a:solidFill>
+                <a:latin typeface="Lato Light" panose="020F0502020204030203" pitchFamily="34" charset="0"/>
+              </a:endParaRPr>
+            </a:p>
+          </p:txBody>
+        </p:sp>
+        <p:sp>
+          <p:nvSpPr>
+            <p:cNvPr id="24" name="Freeform 9">
+              <a:extLst>
+                <a:ext uri="{FF2B5EF4-FFF2-40B4-BE49-F238E27FC236}">
+                  <a16:creationId xmlns:a16="http://schemas.microsoft.com/office/drawing/2014/main" id="{C4718D75-BC9E-4501-9449-74ECCFE64FC1}"/>
+                </a:ext>
+              </a:extLst>
+            </p:cNvPr>
+            <p:cNvSpPr>
+              <a:spLocks noChangeArrowheads="1"/>
+            </p:cNvSpPr>
+            <p:nvPr/>
+          </p:nvSpPr>
+          <p:spPr bwMode="auto">
+            <a:xfrm rot="6515535">
+              <a:off x="4835925" y="3285018"/>
+              <a:ext cx="104820" cy="2274486"/>
+            </a:xfrm>
+            <a:custGeom>
+              <a:avLst/>
+              <a:gdLst>
+                <a:gd name="T0" fmla="*/ 0 w 367"/>
+                <a:gd name="T1" fmla="*/ 250 h 7944"/>
+                <a:gd name="T2" fmla="*/ 0 w 367"/>
+                <a:gd name="T3" fmla="*/ 250 h 7944"/>
+                <a:gd name="T4" fmla="*/ 183 w 367"/>
+                <a:gd name="T5" fmla="*/ 0 h 7944"/>
+                <a:gd name="T6" fmla="*/ 183 w 367"/>
+                <a:gd name="T7" fmla="*/ 0 h 7944"/>
+                <a:gd name="T8" fmla="*/ 366 w 367"/>
+                <a:gd name="T9" fmla="*/ 250 h 7944"/>
+                <a:gd name="T10" fmla="*/ 366 w 367"/>
+                <a:gd name="T11" fmla="*/ 7693 h 7944"/>
+                <a:gd name="T12" fmla="*/ 366 w 367"/>
+                <a:gd name="T13" fmla="*/ 7693 h 7944"/>
+                <a:gd name="T14" fmla="*/ 183 w 367"/>
+                <a:gd name="T15" fmla="*/ 7943 h 7944"/>
+                <a:gd name="T16" fmla="*/ 183 w 367"/>
+                <a:gd name="T17" fmla="*/ 7943 h 7944"/>
+                <a:gd name="T18" fmla="*/ 0 w 367"/>
+                <a:gd name="T19" fmla="*/ 7693 h 7944"/>
+                <a:gd name="T20" fmla="*/ 0 w 367"/>
+                <a:gd name="T21" fmla="*/ 250 h 7944"/>
+              </a:gdLst>
+              <a:ahLst/>
+              <a:cxnLst>
+                <a:cxn ang="0">
+                  <a:pos x="T0" y="T1"/>
+                </a:cxn>
+                <a:cxn ang="0">
+                  <a:pos x="T2" y="T3"/>
+                </a:cxn>
+                <a:cxn ang="0">
+                  <a:pos x="T4" y="T5"/>
+                </a:cxn>
+                <a:cxn ang="0">
+                  <a:pos x="T6" y="T7"/>
+                </a:cxn>
+                <a:cxn ang="0">
+                  <a:pos x="T8" y="T9"/>
+                </a:cxn>
+                <a:cxn ang="0">
+                  <a:pos x="T10" y="T11"/>
+                </a:cxn>
+                <a:cxn ang="0">
+                  <a:pos x="T12" y="T13"/>
+                </a:cxn>
+                <a:cxn ang="0">
+                  <a:pos x="T14" y="T15"/>
+                </a:cxn>
+                <a:cxn ang="0">
+                  <a:pos x="T16" y="T17"/>
+                </a:cxn>
+                <a:cxn ang="0">
+                  <a:pos x="T18" y="T19"/>
+                </a:cxn>
+                <a:cxn ang="0">
+                  <a:pos x="T20" y="T21"/>
+                </a:cxn>
+              </a:cxnLst>
+              <a:rect l="0" t="0" r="r" b="b"/>
+              <a:pathLst>
+                <a:path w="367" h="7944">
+                  <a:moveTo>
+                    <a:pt x="0" y="250"/>
+                  </a:moveTo>
+                  <a:lnTo>
+                    <a:pt x="0" y="250"/>
+                  </a:lnTo>
+                  <a:cubicBezTo>
+                    <a:pt x="0" y="111"/>
+                    <a:pt x="82" y="0"/>
+                    <a:pt x="183" y="0"/>
+                  </a:cubicBezTo>
+                  <a:lnTo>
+                    <a:pt x="183" y="0"/>
+                  </a:lnTo>
+                  <a:cubicBezTo>
+                    <a:pt x="284" y="0"/>
+                    <a:pt x="366" y="111"/>
+                    <a:pt x="366" y="250"/>
+                  </a:cubicBezTo>
+                  <a:lnTo>
+                    <a:pt x="366" y="7693"/>
+                  </a:lnTo>
+                  <a:lnTo>
+                    <a:pt x="366" y="7693"/>
+                  </a:lnTo>
+                  <a:cubicBezTo>
+                    <a:pt x="366" y="7831"/>
+                    <a:pt x="284" y="7943"/>
+                    <a:pt x="183" y="7943"/>
+                  </a:cubicBezTo>
+                  <a:lnTo>
+                    <a:pt x="183" y="7943"/>
+                  </a:lnTo>
+                  <a:cubicBezTo>
+                    <a:pt x="82" y="7943"/>
+                    <a:pt x="0" y="7831"/>
+                    <a:pt x="0" y="7693"/>
+                  </a:cubicBezTo>
+                  <a:lnTo>
+                    <a:pt x="0" y="250"/>
+                  </a:lnTo>
+                </a:path>
+              </a:pathLst>
+            </a:custGeom>
+            <a:solidFill>
+              <a:schemeClr val="accent1"/>
+            </a:solidFill>
+            <a:ln>
+              <a:noFill/>
+            </a:ln>
+            <a:effectLst/>
+          </p:spPr>
+          <p:txBody>
+            <a:bodyPr wrap="none" anchor="ctr"/>
+            <a:lstStyle/>
+            <a:p>
+              <a:pPr defTabSz="743076"/>
+              <a:endParaRPr lang="en-US" sz="2655">
+                <a:solidFill>
+                  <a:srgbClr val="7F7F7F"/>
+                </a:solidFill>
+                <a:latin typeface="Lato Light" panose="020F0502020204030203" pitchFamily="34" charset="0"/>
+              </a:endParaRPr>
+            </a:p>
+          </p:txBody>
+        </p:sp>
+        <p:sp>
+          <p:nvSpPr>
+            <p:cNvPr id="25" name="Teardrop 24">
+              <a:extLst>
+                <a:ext uri="{FF2B5EF4-FFF2-40B4-BE49-F238E27FC236}">
+                  <a16:creationId xmlns:a16="http://schemas.microsoft.com/office/drawing/2014/main" id="{34C9E9D7-A739-4FF0-BAEE-3A7E44992BB9}"/>
+                </a:ext>
+              </a:extLst>
+            </p:cNvPr>
+            <p:cNvSpPr>
+              <a:spLocks/>
+            </p:cNvSpPr>
+            <p:nvPr/>
+          </p:nvSpPr>
+          <p:spPr>
+            <a:xfrm rot="3378098">
+              <a:off x="5568036" y="4373228"/>
+              <a:ext cx="745233" cy="787578"/>
+            </a:xfrm>
+            <a:prstGeom prst="teardrop">
+              <a:avLst>
+                <a:gd name="adj" fmla="val 29107"/>
+              </a:avLst>
+            </a:prstGeom>
+            <a:solidFill>
+              <a:schemeClr val="accent1">
+                <a:alpha val="50000"/>
+              </a:schemeClr>
+            </a:solidFill>
+            <a:ln>
+              <a:noFill/>
+            </a:ln>
+          </p:spPr>
+          <p:style>
+            <a:lnRef idx="2">
+              <a:schemeClr val="accent1">
+                <a:shade val="50000"/>
+              </a:schemeClr>
+            </a:lnRef>
+            <a:fillRef idx="1">
+              <a:schemeClr val="accent1"/>
+            </a:fillRef>
+            <a:effectRef idx="0">
+              <a:schemeClr val="accent1"/>
+            </a:effectRef>
+            <a:fontRef idx="minor">
+              <a:schemeClr val="lt1"/>
+            </a:fontRef>
+          </p:style>
+          <p:txBody>
+            <a:bodyPr rtlCol="0" anchor="ctr"/>
+            <a:lstStyle/>
+            <a:p>
+              <a:pPr algn="ctr" defTabSz="743076"/>
+              <a:endParaRPr lang="en-US" sz="1463" dirty="0">
+                <a:solidFill>
+                  <a:srgbClr val="FFFFFF"/>
+                </a:solidFill>
+                <a:latin typeface="Lato Light" panose="020F0502020204030203" pitchFamily="34" charset="0"/>
+              </a:endParaRPr>
+            </a:p>
+          </p:txBody>
+        </p:sp>
+      </p:grpSp>
     </p:spTree>
     <p:extLst>
       <p:ext uri="{BB962C8B-B14F-4D97-AF65-F5344CB8AC3E}">
-        <p14:creationId xmlns:p14="http://schemas.microsoft.com/office/powerpoint/2010/main" val="3887058040"/>
+        <p14:creationId xmlns:p14="http://schemas.microsoft.com/office/powerpoint/2010/main" val="2204397293"/>
       </p:ext>
     </p:extLst>
   </p:cSld>

</xml_diff>